<commit_message>
add slides explaining derived features
</commit_message>
<xml_diff>
--- a/Lam_Contribution.pptx
+++ b/Lam_Contribution.pptx
@@ -15,13 +15,15 @@
     <p:sldId id="267" r:id="rId9"/>
     <p:sldId id="265" r:id="rId10"/>
     <p:sldId id="271" r:id="rId11"/>
-    <p:sldId id="272" r:id="rId12"/>
-    <p:sldId id="260" r:id="rId13"/>
-    <p:sldId id="259" r:id="rId14"/>
-    <p:sldId id="261" r:id="rId15"/>
-    <p:sldId id="268" r:id="rId16"/>
-    <p:sldId id="269" r:id="rId17"/>
-    <p:sldId id="270" r:id="rId18"/>
+    <p:sldId id="273" r:id="rId12"/>
+    <p:sldId id="272" r:id="rId13"/>
+    <p:sldId id="274" r:id="rId14"/>
+    <p:sldId id="260" r:id="rId15"/>
+    <p:sldId id="259" r:id="rId16"/>
+    <p:sldId id="261" r:id="rId17"/>
+    <p:sldId id="268" r:id="rId18"/>
+    <p:sldId id="269" r:id="rId19"/>
+    <p:sldId id="270" r:id="rId20"/>
   </p:sldIdLst>
   <p:sldSz cx="12192000" cy="6858000"/>
   <p:notesSz cx="6858000" cy="9144000"/>
@@ -3948,8 +3950,125 @@
             </a:r>
           </a:p>
           <a:p>
+            <a:r>
+              <a:rPr lang="en-US" dirty="0"/>
+              <a:t>N Clusters selection: Select largest N that provides greater than 10% reduction in Sum of Squares Error</a:t>
+            </a:r>
+          </a:p>
+          <a:p>
+            <a:r>
+              <a:rPr lang="en-US" dirty="0"/>
+              <a:t>Input Features:</a:t>
+            </a:r>
+          </a:p>
+          <a:p>
             <a:pPr lvl="1"/>
             <a:endParaRPr lang="en-US" dirty="0"/>
+          </a:p>
+        </p:txBody>
+      </p:sp>
+      <p:pic>
+        <p:nvPicPr>
+          <p:cNvPr id="4" name="Picture 3">
+            <a:extLst>
+              <a:ext uri="{FF2B5EF4-FFF2-40B4-BE49-F238E27FC236}">
+                <a16:creationId xmlns:a16="http://schemas.microsoft.com/office/drawing/2014/main" id="{50366848-B299-244C-8217-6EE94E3D5389}"/>
+              </a:ext>
+            </a:extLst>
+          </p:cNvPr>
+          <p:cNvPicPr>
+            <a:picLocks noChangeAspect="1"/>
+          </p:cNvPicPr>
+          <p:nvPr/>
+        </p:nvPicPr>
+        <p:blipFill rotWithShape="1">
+          <a:blip r:embed="rId2"/>
+          <a:srcRect t="9989"/>
+          <a:stretch/>
+        </p:blipFill>
+        <p:spPr>
+          <a:xfrm>
+            <a:off x="3547035" y="3836239"/>
+            <a:ext cx="1616635" cy="2786436"/>
+          </a:xfrm>
+          <a:prstGeom prst="rect">
+            <a:avLst/>
+          </a:prstGeom>
+        </p:spPr>
+      </p:pic>
+      <p:pic>
+        <p:nvPicPr>
+          <p:cNvPr id="6" name="Picture 5">
+            <a:extLst>
+              <a:ext uri="{FF2B5EF4-FFF2-40B4-BE49-F238E27FC236}">
+                <a16:creationId xmlns:a16="http://schemas.microsoft.com/office/drawing/2014/main" id="{554B9F47-46EF-1949-A230-0327E5F2BCDB}"/>
+              </a:ext>
+            </a:extLst>
+          </p:cNvPr>
+          <p:cNvPicPr>
+            <a:picLocks noChangeAspect="1"/>
+          </p:cNvPicPr>
+          <p:nvPr/>
+        </p:nvPicPr>
+        <p:blipFill>
+          <a:blip r:embed="rId3"/>
+          <a:stretch>
+            <a:fillRect/>
+          </a:stretch>
+        </p:blipFill>
+        <p:spPr>
+          <a:xfrm>
+            <a:off x="7128435" y="4099157"/>
+            <a:ext cx="1879600" cy="2260600"/>
+          </a:xfrm>
+          <a:prstGeom prst="rect">
+            <a:avLst/>
+          </a:prstGeom>
+        </p:spPr>
+      </p:pic>
+      <p:sp>
+        <p:nvSpPr>
+          <p:cNvPr id="7" name="Right Arrow 6">
+            <a:extLst>
+              <a:ext uri="{FF2B5EF4-FFF2-40B4-BE49-F238E27FC236}">
+                <a16:creationId xmlns:a16="http://schemas.microsoft.com/office/drawing/2014/main" id="{CCA8CFA7-2E59-204D-9478-7878C51BFA34}"/>
+              </a:ext>
+            </a:extLst>
+          </p:cNvPr>
+          <p:cNvSpPr/>
+          <p:nvPr/>
+        </p:nvSpPr>
+        <p:spPr>
+          <a:xfrm>
+            <a:off x="5616388" y="4693795"/>
+            <a:ext cx="1111624" cy="866962"/>
+          </a:xfrm>
+          <a:prstGeom prst="rightArrow">
+            <a:avLst/>
+          </a:prstGeom>
+        </p:spPr>
+        <p:style>
+          <a:lnRef idx="2">
+            <a:schemeClr val="accent1">
+              <a:shade val="50000"/>
+            </a:schemeClr>
+          </a:lnRef>
+          <a:fillRef idx="1">
+            <a:schemeClr val="accent1"/>
+          </a:fillRef>
+          <a:effectRef idx="0">
+            <a:schemeClr val="accent1"/>
+          </a:effectRef>
+          <a:fontRef idx="minor">
+            <a:schemeClr val="lt1"/>
+          </a:fontRef>
+        </p:style>
+        <p:txBody>
+          <a:bodyPr rtlCol="0" anchor="ctr"/>
+          <a:lstStyle/>
+          <a:p>
+            <a:pPr algn="ctr"/>
+            <a:endParaRPr lang="en-US"/>
           </a:p>
         </p:txBody>
       </p:sp>
@@ -3985,10 +4104,10 @@
       </p:grpSpPr>
       <p:sp>
         <p:nvSpPr>
-          <p:cNvPr id="5" name="Title 4">
+          <p:cNvPr id="2" name="Title 1">
             <a:extLst>
               <a:ext uri="{FF2B5EF4-FFF2-40B4-BE49-F238E27FC236}">
-                <a16:creationId xmlns:a16="http://schemas.microsoft.com/office/drawing/2014/main" id="{91B95845-65B3-C141-B5BF-52E3A28B923E}"/>
+                <a16:creationId xmlns:a16="http://schemas.microsoft.com/office/drawing/2014/main" id="{A9A94B43-90F2-5642-8BB7-074DF57E1875}"/>
               </a:ext>
             </a:extLst>
           </p:cNvPr>
@@ -4006,52 +4125,17 @@
           <a:p>
             <a:r>
               <a:rPr lang="en-US" dirty="0"/>
-              <a:t>Clustering (Attempt 2)</a:t>
-            </a:r>
-          </a:p>
-        </p:txBody>
-      </p:sp>
-      <p:sp>
-        <p:nvSpPr>
-          <p:cNvPr id="8" name="TextBox 7">
+              <a:t>Derived Input Features</a:t>
+            </a:r>
+          </a:p>
+        </p:txBody>
+      </p:sp>
+      <p:pic>
+        <p:nvPicPr>
+          <p:cNvPr id="8" name="Picture 7">
             <a:extLst>
               <a:ext uri="{FF2B5EF4-FFF2-40B4-BE49-F238E27FC236}">
-                <a16:creationId xmlns:a16="http://schemas.microsoft.com/office/drawing/2014/main" id="{068DFBF0-1D16-4D44-B1C0-EAAB238D29A7}"/>
-              </a:ext>
-            </a:extLst>
-          </p:cNvPr>
-          <p:cNvSpPr txBox="1"/>
-          <p:nvPr/>
-        </p:nvSpPr>
-        <p:spPr>
-          <a:xfrm>
-            <a:off x="7036231" y="505420"/>
-            <a:ext cx="3936569" cy="923330"/>
-          </a:xfrm>
-          <a:prstGeom prst="rect">
-            <a:avLst/>
-          </a:prstGeom>
-          <a:noFill/>
-        </p:spPr>
-        <p:txBody>
-          <a:bodyPr wrap="square" rtlCol="0">
-            <a:spAutoFit/>
-          </a:bodyPr>
-          <a:lstStyle/>
-          <a:p>
-            <a:r>
-              <a:rPr lang="en-US" dirty="0"/>
-              <a:t>Each Row is a random sample of user’s rating distribution from each of the clusters determined by K-Means. </a:t>
-            </a:r>
-          </a:p>
-        </p:txBody>
-      </p:sp>
-      <p:pic>
-        <p:nvPicPr>
-          <p:cNvPr id="6" name="Picture 5">
-            <a:extLst>
-              <a:ext uri="{FF2B5EF4-FFF2-40B4-BE49-F238E27FC236}">
-                <a16:creationId xmlns:a16="http://schemas.microsoft.com/office/drawing/2014/main" id="{FDA2F089-8FE4-ED44-88B3-4334CA7F08BC}"/>
+                <a16:creationId xmlns:a16="http://schemas.microsoft.com/office/drawing/2014/main" id="{D243939C-3A90-BF4E-8951-3986EF7B268F}"/>
               </a:ext>
             </a:extLst>
           </p:cNvPr>
@@ -4068,18 +4152,702 @@
         </p:blipFill>
         <p:spPr>
           <a:xfrm>
-            <a:off x="1371600" y="1428750"/>
-            <a:ext cx="9601200" cy="4922442"/>
+            <a:off x="7764183" y="1427967"/>
+            <a:ext cx="3208617" cy="2429381"/>
           </a:xfrm>
           <a:prstGeom prst="rect">
             <a:avLst/>
           </a:prstGeom>
         </p:spPr>
       </p:pic>
+      <p:cxnSp>
+        <p:nvCxnSpPr>
+          <p:cNvPr id="10" name="Straight Connector 9">
+            <a:extLst>
+              <a:ext uri="{FF2B5EF4-FFF2-40B4-BE49-F238E27FC236}">
+                <a16:creationId xmlns:a16="http://schemas.microsoft.com/office/drawing/2014/main" id="{66138A59-C25E-B94F-9DD0-4E4FD92FD519}"/>
+              </a:ext>
+            </a:extLst>
+          </p:cNvPr>
+          <p:cNvCxnSpPr>
+            <a:cxnSpLocks/>
+          </p:cNvCxnSpPr>
+          <p:nvPr/>
+        </p:nvCxnSpPr>
+        <p:spPr>
+          <a:xfrm>
+            <a:off x="8203682" y="2609039"/>
+            <a:ext cx="1164809" cy="601279"/>
+          </a:xfrm>
+          <a:prstGeom prst="line">
+            <a:avLst/>
+          </a:prstGeom>
+          <a:ln w="76200">
+            <a:solidFill>
+              <a:schemeClr val="accent6"/>
+            </a:solidFill>
+          </a:ln>
+        </p:spPr>
+        <p:style>
+          <a:lnRef idx="2">
+            <a:schemeClr val="accent6"/>
+          </a:lnRef>
+          <a:fillRef idx="0">
+            <a:schemeClr val="accent6"/>
+          </a:fillRef>
+          <a:effectRef idx="1">
+            <a:schemeClr val="accent6"/>
+          </a:effectRef>
+          <a:fontRef idx="minor">
+            <a:schemeClr val="tx1"/>
+          </a:fontRef>
+        </p:style>
+      </p:cxnSp>
+      <p:cxnSp>
+        <p:nvCxnSpPr>
+          <p:cNvPr id="12" name="Straight Connector 11">
+            <a:extLst>
+              <a:ext uri="{FF2B5EF4-FFF2-40B4-BE49-F238E27FC236}">
+                <a16:creationId xmlns:a16="http://schemas.microsoft.com/office/drawing/2014/main" id="{F075C165-8309-B046-B15E-220ABEE14A31}"/>
+              </a:ext>
+            </a:extLst>
+          </p:cNvPr>
+          <p:cNvCxnSpPr>
+            <a:cxnSpLocks/>
+          </p:cNvCxnSpPr>
+          <p:nvPr/>
+        </p:nvCxnSpPr>
+        <p:spPr>
+          <a:xfrm flipV="1">
+            <a:off x="9368491" y="1699329"/>
+            <a:ext cx="1084356" cy="1581678"/>
+          </a:xfrm>
+          <a:prstGeom prst="line">
+            <a:avLst/>
+          </a:prstGeom>
+          <a:ln w="76200">
+            <a:solidFill>
+              <a:schemeClr val="accent6"/>
+            </a:solidFill>
+          </a:ln>
+        </p:spPr>
+        <p:style>
+          <a:lnRef idx="1">
+            <a:schemeClr val="accent1"/>
+          </a:lnRef>
+          <a:fillRef idx="0">
+            <a:schemeClr val="accent1"/>
+          </a:fillRef>
+          <a:effectRef idx="0">
+            <a:schemeClr val="accent1"/>
+          </a:effectRef>
+          <a:fontRef idx="minor">
+            <a:schemeClr val="tx1"/>
+          </a:fontRef>
+        </p:style>
+      </p:cxnSp>
+      <p:graphicFrame>
+        <p:nvGraphicFramePr>
+          <p:cNvPr id="16" name="Table 15">
+            <a:extLst>
+              <a:ext uri="{FF2B5EF4-FFF2-40B4-BE49-F238E27FC236}">
+                <a16:creationId xmlns:a16="http://schemas.microsoft.com/office/drawing/2014/main" id="{B17C7E46-E9DB-7347-B5A6-29C9352D6F2E}"/>
+              </a:ext>
+            </a:extLst>
+          </p:cNvPr>
+          <p:cNvGraphicFramePr>
+            <a:graphicFrameLocks noGrp="1"/>
+          </p:cNvGraphicFramePr>
+          <p:nvPr>
+            <p:extLst>
+              <p:ext uri="{D42A27DB-BD31-4B8C-83A1-F6EECF244321}">
+                <p14:modId xmlns:p14="http://schemas.microsoft.com/office/powerpoint/2010/main" val="3615075758"/>
+              </p:ext>
+            </p:extLst>
+          </p:nvPr>
+        </p:nvGraphicFramePr>
+        <p:xfrm>
+          <a:off x="1371600" y="1427967"/>
+          <a:ext cx="6156542" cy="4501832"/>
+        </p:xfrm>
+        <a:graphic>
+          <a:graphicData uri="http://schemas.openxmlformats.org/drawingml/2006/table">
+            <a:tbl>
+              <a:tblPr firstRow="1" firstCol="1" bandRow="1">
+                <a:tableStyleId>{5C22544A-7EE6-4342-B048-85BDC9FD1C3A}</a:tableStyleId>
+              </a:tblPr>
+              <a:tblGrid>
+                <a:gridCol w="532356">
+                  <a:extLst>
+                    <a:ext uri="{9D8B030D-6E8A-4147-A177-3AD203B41FA5}">
+                      <a16:colId xmlns:a16="http://schemas.microsoft.com/office/drawing/2014/main" val="1366326285"/>
+                    </a:ext>
+                  </a:extLst>
+                </a:gridCol>
+                <a:gridCol w="1352811">
+                  <a:extLst>
+                    <a:ext uri="{9D8B030D-6E8A-4147-A177-3AD203B41FA5}">
+                      <a16:colId xmlns:a16="http://schemas.microsoft.com/office/drawing/2014/main" val="112193913"/>
+                    </a:ext>
+                  </a:extLst>
+                </a:gridCol>
+                <a:gridCol w="2648907">
+                  <a:extLst>
+                    <a:ext uri="{9D8B030D-6E8A-4147-A177-3AD203B41FA5}">
+                      <a16:colId xmlns:a16="http://schemas.microsoft.com/office/drawing/2014/main" val="3278708337"/>
+                    </a:ext>
+                  </a:extLst>
+                </a:gridCol>
+                <a:gridCol w="1622468">
+                  <a:extLst>
+                    <a:ext uri="{9D8B030D-6E8A-4147-A177-3AD203B41FA5}">
+                      <a16:colId xmlns:a16="http://schemas.microsoft.com/office/drawing/2014/main" val="830597694"/>
+                    </a:ext>
+                  </a:extLst>
+                </a:gridCol>
+              </a:tblGrid>
+              <a:tr h="425885">
+                <a:tc>
+                  <a:txBody>
+                    <a:bodyPr/>
+                    <a:lstStyle/>
+                    <a:p>
+                      <a:r>
+                        <a:rPr lang="en-US" dirty="0"/>
+                        <a:t>Key</a:t>
+                      </a:r>
+                    </a:p>
+                  </a:txBody>
+                  <a:tcPr/>
+                </a:tc>
+                <a:tc>
+                  <a:txBody>
+                    <a:bodyPr/>
+                    <a:lstStyle/>
+                    <a:p>
+                      <a:r>
+                        <a:rPr lang="en-US" dirty="0"/>
+                        <a:t>Metric</a:t>
+                      </a:r>
+                    </a:p>
+                  </a:txBody>
+                  <a:tcPr/>
+                </a:tc>
+                <a:tc>
+                  <a:txBody>
+                    <a:bodyPr/>
+                    <a:lstStyle/>
+                    <a:p>
+                      <a:r>
+                        <a:rPr lang="en-US" dirty="0"/>
+                        <a:t>Definition</a:t>
+                      </a:r>
+                    </a:p>
+                  </a:txBody>
+                  <a:tcPr/>
+                </a:tc>
+                <a:tc>
+                  <a:txBody>
+                    <a:bodyPr/>
+                    <a:lstStyle/>
+                    <a:p>
+                      <a:r>
+                        <a:rPr lang="en-US" dirty="0"/>
+                        <a:t>Intent</a:t>
+                      </a:r>
+                    </a:p>
+                  </a:txBody>
+                  <a:tcPr/>
+                </a:tc>
+                <a:extLst>
+                  <a:ext uri="{0D108BD9-81ED-4DB2-BD59-A6C34878D82A}">
+                    <a16:rowId xmlns:a16="http://schemas.microsoft.com/office/drawing/2014/main" val="2419489660"/>
+                  </a:ext>
+                </a:extLst>
+              </a:tr>
+              <a:tr h="862447">
+                <a:tc>
+                  <a:txBody>
+                    <a:bodyPr/>
+                    <a:lstStyle/>
+                    <a:p>
+                      <a:r>
+                        <a:rPr lang="en-US" dirty="0"/>
+                        <a:t>1</a:t>
+                      </a:r>
+                    </a:p>
+                  </a:txBody>
+                  <a:tcPr/>
+                </a:tc>
+                <a:tc>
+                  <a:txBody>
+                    <a:bodyPr/>
+                    <a:lstStyle/>
+                    <a:p>
+                      <a:r>
+                        <a:rPr lang="en-US" dirty="0"/>
+                        <a:t>Mean-Med</a:t>
+                      </a:r>
+                    </a:p>
+                  </a:txBody>
+                  <a:tcPr/>
+                </a:tc>
+                <a:tc>
+                  <a:txBody>
+                    <a:bodyPr/>
+                    <a:lstStyle/>
+                    <a:p>
+                      <a:r>
+                        <a:rPr lang="en-US" dirty="0"/>
+                        <a:t>Difference between Mean and Median Value</a:t>
+                      </a:r>
+                    </a:p>
+                  </a:txBody>
+                  <a:tcPr/>
+                </a:tc>
+                <a:tc>
+                  <a:txBody>
+                    <a:bodyPr/>
+                    <a:lstStyle/>
+                    <a:p>
+                      <a:r>
+                        <a:rPr lang="en-US" dirty="0"/>
+                        <a:t>Rough Approx. of Skew </a:t>
+                      </a:r>
+                    </a:p>
+                  </a:txBody>
+                  <a:tcPr/>
+                </a:tc>
+                <a:extLst>
+                  <a:ext uri="{0D108BD9-81ED-4DB2-BD59-A6C34878D82A}">
+                    <a16:rowId xmlns:a16="http://schemas.microsoft.com/office/drawing/2014/main" val="3436127502"/>
+                  </a:ext>
+                </a:extLst>
+              </a:tr>
+              <a:tr h="862447">
+                <a:tc>
+                  <a:txBody>
+                    <a:bodyPr/>
+                    <a:lstStyle/>
+                    <a:p>
+                      <a:r>
+                        <a:rPr lang="en-US" dirty="0"/>
+                        <a:t>2</a:t>
+                      </a:r>
+                    </a:p>
+                  </a:txBody>
+                  <a:tcPr/>
+                </a:tc>
+                <a:tc>
+                  <a:txBody>
+                    <a:bodyPr/>
+                    <a:lstStyle/>
+                    <a:p>
+                      <a:r>
+                        <a:rPr lang="en-US" dirty="0"/>
+                        <a:t>Min-Med</a:t>
+                      </a:r>
+                    </a:p>
+                    <a:p>
+                      <a:r>
+                        <a:rPr lang="en-US" dirty="0"/>
+                        <a:t>Slope</a:t>
+                      </a:r>
+                    </a:p>
+                  </a:txBody>
+                  <a:tcPr/>
+                </a:tc>
+                <a:tc>
+                  <a:txBody>
+                    <a:bodyPr/>
+                    <a:lstStyle/>
+                    <a:p>
+                      <a:r>
+                        <a:rPr lang="en-US" dirty="0"/>
+                        <a:t>Slope in Percentage Points from Min to Med</a:t>
+                      </a:r>
+                    </a:p>
+                  </a:txBody>
+                  <a:tcPr/>
+                </a:tc>
+                <a:tc>
+                  <a:txBody>
+                    <a:bodyPr/>
+                    <a:lstStyle/>
+                    <a:p>
+                      <a:endParaRPr lang="en-US" dirty="0"/>
+                    </a:p>
+                  </a:txBody>
+                  <a:tcPr/>
+                </a:tc>
+                <a:extLst>
+                  <a:ext uri="{0D108BD9-81ED-4DB2-BD59-A6C34878D82A}">
+                    <a16:rowId xmlns:a16="http://schemas.microsoft.com/office/drawing/2014/main" val="3926559875"/>
+                  </a:ext>
+                </a:extLst>
+              </a:tr>
+              <a:tr h="862447">
+                <a:tc>
+                  <a:txBody>
+                    <a:bodyPr/>
+                    <a:lstStyle/>
+                    <a:p>
+                      <a:r>
+                        <a:rPr lang="en-US" dirty="0"/>
+                        <a:t>3</a:t>
+                      </a:r>
+                    </a:p>
+                  </a:txBody>
+                  <a:tcPr/>
+                </a:tc>
+                <a:tc>
+                  <a:txBody>
+                    <a:bodyPr/>
+                    <a:lstStyle/>
+                    <a:p>
+                      <a:r>
+                        <a:rPr lang="en-US" dirty="0"/>
+                        <a:t>Med-Max Slope</a:t>
+                      </a:r>
+                    </a:p>
+                  </a:txBody>
+                  <a:tcPr/>
+                </a:tc>
+                <a:tc>
+                  <a:txBody>
+                    <a:bodyPr/>
+                    <a:lstStyle/>
+                    <a:p>
+                      <a:pPr marL="0" marR="0" lvl="0" indent="0" algn="l" defTabSz="914400" rtl="0" eaLnBrk="1" fontAlgn="auto" latinLnBrk="0" hangingPunct="1">
+                        <a:lnSpc>
+                          <a:spcPct val="100000"/>
+                        </a:lnSpc>
+                        <a:spcBef>
+                          <a:spcPts val="0"/>
+                        </a:spcBef>
+                        <a:spcAft>
+                          <a:spcPts val="0"/>
+                        </a:spcAft>
+                        <a:buClrTx/>
+                        <a:buSzTx/>
+                        <a:buFontTx/>
+                        <a:buNone/>
+                        <a:tabLst/>
+                        <a:defRPr/>
+                      </a:pPr>
+                      <a:r>
+                        <a:rPr lang="en-US" dirty="0"/>
+                        <a:t>Slope in Percentage Points from Med to Max</a:t>
+                      </a:r>
+                    </a:p>
+                  </a:txBody>
+                  <a:tcPr/>
+                </a:tc>
+                <a:tc>
+                  <a:txBody>
+                    <a:bodyPr/>
+                    <a:lstStyle/>
+                    <a:p>
+                      <a:endParaRPr lang="en-US" dirty="0"/>
+                    </a:p>
+                  </a:txBody>
+                  <a:tcPr/>
+                </a:tc>
+                <a:extLst>
+                  <a:ext uri="{0D108BD9-81ED-4DB2-BD59-A6C34878D82A}">
+                    <a16:rowId xmlns:a16="http://schemas.microsoft.com/office/drawing/2014/main" val="2121498006"/>
+                  </a:ext>
+                </a:extLst>
+              </a:tr>
+              <a:tr h="1488606">
+                <a:tc>
+                  <a:txBody>
+                    <a:bodyPr/>
+                    <a:lstStyle/>
+                    <a:p>
+                      <a:r>
+                        <a:rPr lang="en-US" dirty="0"/>
+                        <a:t>4</a:t>
+                      </a:r>
+                    </a:p>
+                  </a:txBody>
+                  <a:tcPr/>
+                </a:tc>
+                <a:tc>
+                  <a:txBody>
+                    <a:bodyPr/>
+                    <a:lstStyle/>
+                    <a:p>
+                      <a:r>
+                        <a:rPr lang="en-US" dirty="0"/>
+                        <a:t>Inflection</a:t>
+                      </a:r>
+                    </a:p>
+                  </a:txBody>
+                  <a:tcPr/>
+                </a:tc>
+                <a:tc>
+                  <a:txBody>
+                    <a:bodyPr/>
+                    <a:lstStyle/>
+                    <a:p>
+                      <a:r>
+                        <a:rPr lang="en-US" dirty="0"/>
+                        <a:t>Product of &lt;2&gt; and &lt;3&gt;</a:t>
+                      </a:r>
+                    </a:p>
+                  </a:txBody>
+                  <a:tcPr/>
+                </a:tc>
+                <a:tc>
+                  <a:txBody>
+                    <a:bodyPr/>
+                    <a:lstStyle/>
+                    <a:p>
+                      <a:r>
+                        <a:rPr lang="en-US" dirty="0"/>
+                        <a:t>Reveals if trend is constant or bell-shaped</a:t>
+                      </a:r>
+                    </a:p>
+                  </a:txBody>
+                  <a:tcPr/>
+                </a:tc>
+                <a:extLst>
+                  <a:ext uri="{0D108BD9-81ED-4DB2-BD59-A6C34878D82A}">
+                    <a16:rowId xmlns:a16="http://schemas.microsoft.com/office/drawing/2014/main" val="167987663"/>
+                  </a:ext>
+                </a:extLst>
+              </a:tr>
+            </a:tbl>
+          </a:graphicData>
+        </a:graphic>
+      </p:graphicFrame>
+      <p:sp>
+        <p:nvSpPr>
+          <p:cNvPr id="22" name="Oval 21">
+            <a:extLst>
+              <a:ext uri="{FF2B5EF4-FFF2-40B4-BE49-F238E27FC236}">
+                <a16:creationId xmlns:a16="http://schemas.microsoft.com/office/drawing/2014/main" id="{58492A4E-9D36-D64B-A247-05EFA03BF343}"/>
+              </a:ext>
+            </a:extLst>
+          </p:cNvPr>
+          <p:cNvSpPr/>
+          <p:nvPr/>
+        </p:nvSpPr>
+        <p:spPr>
+          <a:xfrm>
+            <a:off x="8605381" y="2492679"/>
+            <a:ext cx="388307" cy="388307"/>
+          </a:xfrm>
+          <a:prstGeom prst="ellipse">
+            <a:avLst/>
+          </a:prstGeom>
+        </p:spPr>
+        <p:style>
+          <a:lnRef idx="2">
+            <a:schemeClr val="accent1">
+              <a:shade val="50000"/>
+            </a:schemeClr>
+          </a:lnRef>
+          <a:fillRef idx="1">
+            <a:schemeClr val="accent1"/>
+          </a:fillRef>
+          <a:effectRef idx="0">
+            <a:schemeClr val="accent1"/>
+          </a:effectRef>
+          <a:fontRef idx="minor">
+            <a:schemeClr val="lt1"/>
+          </a:fontRef>
+        </p:style>
+        <p:txBody>
+          <a:bodyPr rtlCol="0" anchor="ctr"/>
+          <a:lstStyle/>
+          <a:p>
+            <a:pPr algn="ctr"/>
+            <a:r>
+              <a:rPr lang="en-US" dirty="0"/>
+              <a:t>2</a:t>
+            </a:r>
+          </a:p>
+        </p:txBody>
+      </p:sp>
+      <p:sp>
+        <p:nvSpPr>
+          <p:cNvPr id="23" name="Oval 22">
+            <a:extLst>
+              <a:ext uri="{FF2B5EF4-FFF2-40B4-BE49-F238E27FC236}">
+                <a16:creationId xmlns:a16="http://schemas.microsoft.com/office/drawing/2014/main" id="{2A651403-7638-064A-9EC5-BB0A5EEA697D}"/>
+              </a:ext>
+            </a:extLst>
+          </p:cNvPr>
+          <p:cNvSpPr/>
+          <p:nvPr/>
+        </p:nvSpPr>
+        <p:spPr>
+          <a:xfrm>
+            <a:off x="9471170" y="2020371"/>
+            <a:ext cx="439499" cy="439499"/>
+          </a:xfrm>
+          <a:prstGeom prst="ellipse">
+            <a:avLst/>
+          </a:prstGeom>
+        </p:spPr>
+        <p:style>
+          <a:lnRef idx="2">
+            <a:schemeClr val="accent1">
+              <a:shade val="50000"/>
+            </a:schemeClr>
+          </a:lnRef>
+          <a:fillRef idx="1">
+            <a:schemeClr val="accent1"/>
+          </a:fillRef>
+          <a:effectRef idx="0">
+            <a:schemeClr val="accent1"/>
+          </a:effectRef>
+          <a:fontRef idx="minor">
+            <a:schemeClr val="lt1"/>
+          </a:fontRef>
+        </p:style>
+        <p:txBody>
+          <a:bodyPr rtlCol="0" anchor="ctr"/>
+          <a:lstStyle/>
+          <a:p>
+            <a:pPr algn="ctr"/>
+            <a:r>
+              <a:rPr lang="en-US" dirty="0"/>
+              <a:t>3</a:t>
+            </a:r>
+          </a:p>
+        </p:txBody>
+      </p:sp>
+      <p:sp>
+        <p:nvSpPr>
+          <p:cNvPr id="24" name="Oval 23">
+            <a:extLst>
+              <a:ext uri="{FF2B5EF4-FFF2-40B4-BE49-F238E27FC236}">
+                <a16:creationId xmlns:a16="http://schemas.microsoft.com/office/drawing/2014/main" id="{A3F26841-D980-9445-A66D-45F9D984B902}"/>
+              </a:ext>
+            </a:extLst>
+          </p:cNvPr>
+          <p:cNvSpPr/>
+          <p:nvPr/>
+        </p:nvSpPr>
+        <p:spPr>
+          <a:xfrm>
+            <a:off x="8849349" y="4013479"/>
+            <a:ext cx="388307" cy="388307"/>
+          </a:xfrm>
+          <a:prstGeom prst="ellipse">
+            <a:avLst/>
+          </a:prstGeom>
+        </p:spPr>
+        <p:style>
+          <a:lnRef idx="2">
+            <a:schemeClr val="accent1">
+              <a:shade val="50000"/>
+            </a:schemeClr>
+          </a:lnRef>
+          <a:fillRef idx="1">
+            <a:schemeClr val="accent1"/>
+          </a:fillRef>
+          <a:effectRef idx="0">
+            <a:schemeClr val="accent1"/>
+          </a:effectRef>
+          <a:fontRef idx="minor">
+            <a:schemeClr val="lt1"/>
+          </a:fontRef>
+        </p:style>
+        <p:txBody>
+          <a:bodyPr rtlCol="0" anchor="ctr"/>
+          <a:lstStyle/>
+          <a:p>
+            <a:pPr algn="ctr"/>
+            <a:r>
+              <a:rPr lang="en-US" dirty="0"/>
+              <a:t>4</a:t>
+            </a:r>
+          </a:p>
+        </p:txBody>
+      </p:sp>
+      <p:sp>
+        <p:nvSpPr>
+          <p:cNvPr id="25" name="TextBox 24">
+            <a:extLst>
+              <a:ext uri="{FF2B5EF4-FFF2-40B4-BE49-F238E27FC236}">
+                <a16:creationId xmlns:a16="http://schemas.microsoft.com/office/drawing/2014/main" id="{045D02C5-91B2-744D-A4F3-3B34B24A642A}"/>
+              </a:ext>
+            </a:extLst>
+          </p:cNvPr>
+          <p:cNvSpPr txBox="1"/>
+          <p:nvPr/>
+        </p:nvSpPr>
+        <p:spPr>
+          <a:xfrm>
+            <a:off x="9237657" y="3950030"/>
+            <a:ext cx="673012" cy="461665"/>
+          </a:xfrm>
+          <a:prstGeom prst="rect">
+            <a:avLst/>
+          </a:prstGeom>
+          <a:noFill/>
+        </p:spPr>
+        <p:txBody>
+          <a:bodyPr wrap="square" rtlCol="0">
+            <a:spAutoFit/>
+          </a:bodyPr>
+          <a:lstStyle/>
+          <a:p>
+            <a:r>
+              <a:rPr lang="en-US" dirty="0"/>
+              <a:t>= </a:t>
+            </a:r>
+            <a:r>
+              <a:rPr lang="en-US" sz="2400" b="1" dirty="0"/>
+              <a:t>-x</a:t>
+            </a:r>
+            <a:endParaRPr lang="en-US" b="1" dirty="0"/>
+          </a:p>
+        </p:txBody>
+      </p:sp>
+      <p:sp>
+        <p:nvSpPr>
+          <p:cNvPr id="26" name="TextBox 25">
+            <a:extLst>
+              <a:ext uri="{FF2B5EF4-FFF2-40B4-BE49-F238E27FC236}">
+                <a16:creationId xmlns:a16="http://schemas.microsoft.com/office/drawing/2014/main" id="{48E2062E-12FA-2248-B893-E796470B573D}"/>
+              </a:ext>
+            </a:extLst>
+          </p:cNvPr>
+          <p:cNvSpPr txBox="1"/>
+          <p:nvPr/>
+        </p:nvSpPr>
+        <p:spPr>
+          <a:xfrm>
+            <a:off x="7764183" y="4617720"/>
+            <a:ext cx="3208617" cy="584775"/>
+          </a:xfrm>
+          <a:prstGeom prst="rect">
+            <a:avLst/>
+          </a:prstGeom>
+          <a:noFill/>
+        </p:spPr>
+        <p:txBody>
+          <a:bodyPr wrap="square" rtlCol="0">
+            <a:spAutoFit/>
+          </a:bodyPr>
+          <a:lstStyle/>
+          <a:p>
+            <a:r>
+              <a:rPr lang="en-US" sz="1600" dirty="0"/>
+              <a:t>Inflection is negative if the two slopes are in opposite directions.</a:t>
+            </a:r>
+          </a:p>
+        </p:txBody>
+      </p:sp>
     </p:spTree>
     <p:extLst>
       <p:ext uri="{BB962C8B-B14F-4D97-AF65-F5344CB8AC3E}">
-        <p14:creationId xmlns:p14="http://schemas.microsoft.com/office/powerpoint/2010/main" val="742534271"/>
+        <p14:creationId xmlns:p14="http://schemas.microsoft.com/office/powerpoint/2010/main" val="2623640704"/>
       </p:ext>
     </p:extLst>
   </p:cSld>
@@ -4108,10 +4876,10 @@
       </p:grpSpPr>
       <p:sp>
         <p:nvSpPr>
-          <p:cNvPr id="2" name="Title 1">
+          <p:cNvPr id="5" name="Title 4">
             <a:extLst>
               <a:ext uri="{FF2B5EF4-FFF2-40B4-BE49-F238E27FC236}">
-                <a16:creationId xmlns:a16="http://schemas.microsoft.com/office/drawing/2014/main" id="{408E883B-88E0-4C45-A53E-3DF1B88F6FB5}"/>
+                <a16:creationId xmlns:a16="http://schemas.microsoft.com/office/drawing/2014/main" id="{91B95845-65B3-C141-B5BF-52E3A28B923E}"/>
               </a:ext>
             </a:extLst>
           </p:cNvPr>
@@ -4129,43 +4897,350 @@
           <a:p>
             <a:r>
               <a:rPr lang="en-US" dirty="0"/>
-              <a:t>Appendix</a:t>
-            </a:r>
-          </a:p>
-        </p:txBody>
-      </p:sp>
-      <p:sp>
-        <p:nvSpPr>
-          <p:cNvPr id="3" name="Text Placeholder 2">
+              <a:t>Clustering (Attempt 2)</a:t>
+            </a:r>
+          </a:p>
+        </p:txBody>
+      </p:sp>
+      <p:sp>
+        <p:nvSpPr>
+          <p:cNvPr id="8" name="TextBox 7">
             <a:extLst>
               <a:ext uri="{FF2B5EF4-FFF2-40B4-BE49-F238E27FC236}">
-                <a16:creationId xmlns:a16="http://schemas.microsoft.com/office/drawing/2014/main" id="{8DCB8633-D41D-9746-B8CB-8D6C1E591EB0}"/>
+                <a16:creationId xmlns:a16="http://schemas.microsoft.com/office/drawing/2014/main" id="{068DFBF0-1D16-4D44-B1C0-EAAB238D29A7}"/>
               </a:ext>
             </a:extLst>
           </p:cNvPr>
-          <p:cNvSpPr>
-            <a:spLocks noGrp="1"/>
-          </p:cNvSpPr>
-          <p:nvPr>
-            <p:ph type="body" idx="1"/>
-          </p:nvPr>
-        </p:nvSpPr>
-        <p:spPr/>
-        <p:txBody>
-          <a:bodyPr/>
-          <a:lstStyle/>
-          <a:p>
-            <a:r>
-              <a:rPr lang="en-US" dirty="0"/>
-              <a:t>Code</a:t>
-            </a:r>
+          <p:cNvSpPr txBox="1"/>
+          <p:nvPr/>
+        </p:nvSpPr>
+        <p:spPr>
+          <a:xfrm>
+            <a:off x="7036231" y="505420"/>
+            <a:ext cx="3936569" cy="923330"/>
+          </a:xfrm>
+          <a:prstGeom prst="rect">
+            <a:avLst/>
+          </a:prstGeom>
+          <a:noFill/>
+        </p:spPr>
+        <p:txBody>
+          <a:bodyPr wrap="square" rtlCol="0">
+            <a:spAutoFit/>
+          </a:bodyPr>
+          <a:lstStyle/>
+          <a:p>
+            <a:r>
+              <a:rPr lang="en-US" dirty="0"/>
+              <a:t>Each Row is a random sample of user’s rating distribution from each of the clusters determined by K-Means. </a:t>
+            </a:r>
+          </a:p>
+        </p:txBody>
+      </p:sp>
+      <p:pic>
+        <p:nvPicPr>
+          <p:cNvPr id="6" name="Picture 5">
+            <a:extLst>
+              <a:ext uri="{FF2B5EF4-FFF2-40B4-BE49-F238E27FC236}">
+                <a16:creationId xmlns:a16="http://schemas.microsoft.com/office/drawing/2014/main" id="{FDA2F089-8FE4-ED44-88B3-4334CA7F08BC}"/>
+              </a:ext>
+            </a:extLst>
+          </p:cNvPr>
+          <p:cNvPicPr>
+            <a:picLocks noChangeAspect="1"/>
+          </p:cNvPicPr>
+          <p:nvPr/>
+        </p:nvPicPr>
+        <p:blipFill>
+          <a:blip r:embed="rId2"/>
+          <a:stretch>
+            <a:fillRect/>
+          </a:stretch>
+        </p:blipFill>
+        <p:spPr>
+          <a:xfrm>
+            <a:off x="1371600" y="1428750"/>
+            <a:ext cx="9601200" cy="4922442"/>
+          </a:xfrm>
+          <a:prstGeom prst="rect">
+            <a:avLst/>
+          </a:prstGeom>
+        </p:spPr>
+      </p:pic>
+      <p:sp>
+        <p:nvSpPr>
+          <p:cNvPr id="9" name="Rounded Rectangle 8">
+            <a:extLst>
+              <a:ext uri="{FF2B5EF4-FFF2-40B4-BE49-F238E27FC236}">
+                <a16:creationId xmlns:a16="http://schemas.microsoft.com/office/drawing/2014/main" id="{C0BA42B3-FF6D-0943-A862-554A553BC3B5}"/>
+              </a:ext>
+            </a:extLst>
+          </p:cNvPr>
+          <p:cNvSpPr/>
+          <p:nvPr/>
+        </p:nvSpPr>
+        <p:spPr>
+          <a:xfrm>
+            <a:off x="1371600" y="1559809"/>
+            <a:ext cx="9601200" cy="923330"/>
+          </a:xfrm>
+          <a:prstGeom prst="roundRect">
+            <a:avLst/>
+          </a:prstGeom>
+          <a:noFill/>
+          <a:ln w="76200" cap="flat" cmpd="sng" algn="ctr">
+            <a:solidFill>
+              <a:schemeClr val="accent6"/>
+            </a:solidFill>
+            <a:prstDash val="solid"/>
+            <a:round/>
+            <a:headEnd type="none" w="med" len="med"/>
+            <a:tailEnd type="none" w="med" len="med"/>
+          </a:ln>
+        </p:spPr>
+        <p:style>
+          <a:lnRef idx="0">
+            <a:scrgbClr r="0" g="0" b="0"/>
+          </a:lnRef>
+          <a:fillRef idx="0">
+            <a:scrgbClr r="0" g="0" b="0"/>
+          </a:fillRef>
+          <a:effectRef idx="0">
+            <a:scrgbClr r="0" g="0" b="0"/>
+          </a:effectRef>
+          <a:fontRef idx="minor">
+            <a:schemeClr val="accent6"/>
+          </a:fontRef>
+        </p:style>
+        <p:txBody>
+          <a:bodyPr rtlCol="0" anchor="ctr"/>
+          <a:lstStyle/>
+          <a:p>
+            <a:pPr algn="ctr"/>
+            <a:endParaRPr lang="en-US"/>
+          </a:p>
+        </p:txBody>
+      </p:sp>
+      <p:sp>
+        <p:nvSpPr>
+          <p:cNvPr id="12" name="Rounded Rectangle 11">
+            <a:extLst>
+              <a:ext uri="{FF2B5EF4-FFF2-40B4-BE49-F238E27FC236}">
+                <a16:creationId xmlns:a16="http://schemas.microsoft.com/office/drawing/2014/main" id="{A29B3174-797D-8E45-9649-25A8639BDF68}"/>
+              </a:ext>
+            </a:extLst>
+          </p:cNvPr>
+          <p:cNvSpPr/>
+          <p:nvPr/>
+        </p:nvSpPr>
+        <p:spPr>
+          <a:xfrm>
+            <a:off x="1371600" y="2483139"/>
+            <a:ext cx="9601200" cy="923330"/>
+          </a:xfrm>
+          <a:prstGeom prst="roundRect">
+            <a:avLst/>
+          </a:prstGeom>
+          <a:noFill/>
+          <a:ln w="76200" cap="flat" cmpd="sng" algn="ctr">
+            <a:solidFill>
+              <a:schemeClr val="accent1"/>
+            </a:solidFill>
+            <a:prstDash val="solid"/>
+            <a:round/>
+            <a:headEnd type="none" w="med" len="med"/>
+            <a:tailEnd type="none" w="med" len="med"/>
+          </a:ln>
+        </p:spPr>
+        <p:style>
+          <a:lnRef idx="0">
+            <a:scrgbClr r="0" g="0" b="0"/>
+          </a:lnRef>
+          <a:fillRef idx="0">
+            <a:scrgbClr r="0" g="0" b="0"/>
+          </a:fillRef>
+          <a:effectRef idx="0">
+            <a:scrgbClr r="0" g="0" b="0"/>
+          </a:effectRef>
+          <a:fontRef idx="minor">
+            <a:schemeClr val="accent1"/>
+          </a:fontRef>
+        </p:style>
+        <p:txBody>
+          <a:bodyPr rtlCol="0" anchor="ctr"/>
+          <a:lstStyle/>
+          <a:p>
+            <a:pPr algn="ctr"/>
+            <a:endParaRPr lang="en-US"/>
+          </a:p>
+        </p:txBody>
+      </p:sp>
+      <p:sp>
+        <p:nvSpPr>
+          <p:cNvPr id="13" name="Rounded Rectangle 12">
+            <a:extLst>
+              <a:ext uri="{FF2B5EF4-FFF2-40B4-BE49-F238E27FC236}">
+                <a16:creationId xmlns:a16="http://schemas.microsoft.com/office/drawing/2014/main" id="{23A93BB4-7976-B241-95C9-1F76F8B04F82}"/>
+              </a:ext>
+            </a:extLst>
+          </p:cNvPr>
+          <p:cNvSpPr/>
+          <p:nvPr/>
+        </p:nvSpPr>
+        <p:spPr>
+          <a:xfrm>
+            <a:off x="1371600" y="3431521"/>
+            <a:ext cx="9601200" cy="923330"/>
+          </a:xfrm>
+          <a:prstGeom prst="roundRect">
+            <a:avLst/>
+          </a:prstGeom>
+          <a:noFill/>
+          <a:ln w="76200" cap="flat" cmpd="sng" algn="ctr">
+            <a:solidFill>
+              <a:schemeClr val="accent6"/>
+            </a:solidFill>
+            <a:prstDash val="solid"/>
+            <a:round/>
+            <a:headEnd type="none" w="med" len="med"/>
+            <a:tailEnd type="none" w="med" len="med"/>
+          </a:ln>
+        </p:spPr>
+        <p:style>
+          <a:lnRef idx="0">
+            <a:scrgbClr r="0" g="0" b="0"/>
+          </a:lnRef>
+          <a:fillRef idx="0">
+            <a:scrgbClr r="0" g="0" b="0"/>
+          </a:fillRef>
+          <a:effectRef idx="0">
+            <a:scrgbClr r="0" g="0" b="0"/>
+          </a:effectRef>
+          <a:fontRef idx="minor">
+            <a:schemeClr val="accent6"/>
+          </a:fontRef>
+        </p:style>
+        <p:txBody>
+          <a:bodyPr rtlCol="0" anchor="ctr"/>
+          <a:lstStyle/>
+          <a:p>
+            <a:pPr algn="ctr"/>
+            <a:endParaRPr lang="en-US"/>
+          </a:p>
+        </p:txBody>
+      </p:sp>
+      <p:sp>
+        <p:nvSpPr>
+          <p:cNvPr id="14" name="Rounded Rectangle 13">
+            <a:extLst>
+              <a:ext uri="{FF2B5EF4-FFF2-40B4-BE49-F238E27FC236}">
+                <a16:creationId xmlns:a16="http://schemas.microsoft.com/office/drawing/2014/main" id="{4BEF374D-61AD-A745-AC64-6234AAC41946}"/>
+              </a:ext>
+            </a:extLst>
+          </p:cNvPr>
+          <p:cNvSpPr/>
+          <p:nvPr/>
+        </p:nvSpPr>
+        <p:spPr>
+          <a:xfrm>
+            <a:off x="1371600" y="4367377"/>
+            <a:ext cx="9601200" cy="923330"/>
+          </a:xfrm>
+          <a:prstGeom prst="roundRect">
+            <a:avLst/>
+          </a:prstGeom>
+          <a:noFill/>
+          <a:ln w="76200" cap="flat" cmpd="sng" algn="ctr">
+            <a:solidFill>
+              <a:schemeClr val="accent1"/>
+            </a:solidFill>
+            <a:prstDash val="solid"/>
+            <a:round/>
+            <a:headEnd type="none" w="med" len="med"/>
+            <a:tailEnd type="none" w="med" len="med"/>
+          </a:ln>
+        </p:spPr>
+        <p:style>
+          <a:lnRef idx="0">
+            <a:scrgbClr r="0" g="0" b="0"/>
+          </a:lnRef>
+          <a:fillRef idx="0">
+            <a:scrgbClr r="0" g="0" b="0"/>
+          </a:fillRef>
+          <a:effectRef idx="0">
+            <a:scrgbClr r="0" g="0" b="0"/>
+          </a:effectRef>
+          <a:fontRef idx="minor">
+            <a:schemeClr val="accent1"/>
+          </a:fontRef>
+        </p:style>
+        <p:txBody>
+          <a:bodyPr rtlCol="0" anchor="ctr"/>
+          <a:lstStyle/>
+          <a:p>
+            <a:pPr algn="ctr"/>
+            <a:endParaRPr lang="en-US"/>
+          </a:p>
+        </p:txBody>
+      </p:sp>
+      <p:sp>
+        <p:nvSpPr>
+          <p:cNvPr id="16" name="Rounded Rectangle 15">
+            <a:extLst>
+              <a:ext uri="{FF2B5EF4-FFF2-40B4-BE49-F238E27FC236}">
+                <a16:creationId xmlns:a16="http://schemas.microsoft.com/office/drawing/2014/main" id="{02F3394F-B90E-E542-94C1-02FE96EDC72D}"/>
+              </a:ext>
+            </a:extLst>
+          </p:cNvPr>
+          <p:cNvSpPr/>
+          <p:nvPr/>
+        </p:nvSpPr>
+        <p:spPr>
+          <a:xfrm>
+            <a:off x="1371600" y="5302304"/>
+            <a:ext cx="9601200" cy="923330"/>
+          </a:xfrm>
+          <a:prstGeom prst="roundRect">
+            <a:avLst/>
+          </a:prstGeom>
+          <a:noFill/>
+          <a:ln w="76200" cap="flat" cmpd="sng" algn="ctr">
+            <a:solidFill>
+              <a:schemeClr val="accent6"/>
+            </a:solidFill>
+            <a:prstDash val="solid"/>
+            <a:round/>
+            <a:headEnd type="none" w="med" len="med"/>
+            <a:tailEnd type="none" w="med" len="med"/>
+          </a:ln>
+        </p:spPr>
+        <p:style>
+          <a:lnRef idx="0">
+            <a:scrgbClr r="0" g="0" b="0"/>
+          </a:lnRef>
+          <a:fillRef idx="0">
+            <a:scrgbClr r="0" g="0" b="0"/>
+          </a:fillRef>
+          <a:effectRef idx="0">
+            <a:scrgbClr r="0" g="0" b="0"/>
+          </a:effectRef>
+          <a:fontRef idx="minor">
+            <a:schemeClr val="accent6"/>
+          </a:fontRef>
+        </p:style>
+        <p:txBody>
+          <a:bodyPr rtlCol="0" anchor="ctr"/>
+          <a:lstStyle/>
+          <a:p>
+            <a:pPr algn="ctr"/>
+            <a:endParaRPr lang="en-US"/>
           </a:p>
         </p:txBody>
       </p:sp>
     </p:spTree>
     <p:extLst>
       <p:ext uri="{BB962C8B-B14F-4D97-AF65-F5344CB8AC3E}">
-        <p14:creationId xmlns:p14="http://schemas.microsoft.com/office/powerpoint/2010/main" val="1111073986"/>
+        <p14:creationId xmlns:p14="http://schemas.microsoft.com/office/powerpoint/2010/main" val="742534271"/>
       </p:ext>
     </p:extLst>
   </p:cSld>
@@ -4197,7 +5272,7 @@
           <p:cNvPr id="2" name="Title 1">
             <a:extLst>
               <a:ext uri="{FF2B5EF4-FFF2-40B4-BE49-F238E27FC236}">
-                <a16:creationId xmlns:a16="http://schemas.microsoft.com/office/drawing/2014/main" id="{4E821EAE-1C76-9D4C-9662-203743DA3FEA}"/>
+                <a16:creationId xmlns:a16="http://schemas.microsoft.com/office/drawing/2014/main" id="{5F835828-F618-BA4B-9C5F-73FBBFD4065E}"/>
               </a:ext>
             </a:extLst>
           </p:cNvPr>
@@ -4215,43 +5290,375 @@
           <a:p>
             <a:r>
               <a:rPr lang="en-US" dirty="0"/>
-              <a:t>Isolating Restaurants/Food Service</a:t>
+              <a:t>Other Findings</a:t>
             </a:r>
           </a:p>
         </p:txBody>
       </p:sp>
       <p:pic>
         <p:nvPicPr>
-          <p:cNvPr id="9" name="Content Placeholder 8">
+          <p:cNvPr id="17" name="Picture 16">
             <a:extLst>
               <a:ext uri="{FF2B5EF4-FFF2-40B4-BE49-F238E27FC236}">
-                <a16:creationId xmlns:a16="http://schemas.microsoft.com/office/drawing/2014/main" id="{4C413E65-C89F-2548-BD10-CDCC75C2F324}"/>
+                <a16:creationId xmlns:a16="http://schemas.microsoft.com/office/drawing/2014/main" id="{98844058-FC98-9A4D-8B5F-438A538E4541}"/>
               </a:ext>
             </a:extLst>
           </p:cNvPr>
           <p:cNvPicPr>
-            <a:picLocks noGrp="1" noChangeAspect="1"/>
+            <a:picLocks noChangeAspect="1"/>
           </p:cNvPicPr>
-          <p:nvPr>
-            <p:ph idx="1"/>
-          </p:nvPr>
+          <p:nvPr/>
         </p:nvPicPr>
-        <p:blipFill rotWithShape="1">
+        <p:blipFill>
           <a:blip r:embed="rId2"/>
-          <a:srcRect b="31275"/>
-          <a:stretch/>
+          <a:stretch>
+            <a:fillRect/>
+          </a:stretch>
         </p:blipFill>
         <p:spPr>
           <a:xfrm>
-            <a:off x="1371600" y="1615864"/>
-            <a:ext cx="10024946" cy="5063905"/>
-          </a:xfrm>
+            <a:off x="5765800" y="1748712"/>
+            <a:ext cx="2600039" cy="1682750"/>
+          </a:xfrm>
+          <a:prstGeom prst="rect">
+            <a:avLst/>
+          </a:prstGeom>
         </p:spPr>
       </p:pic>
+      <p:pic>
+        <p:nvPicPr>
+          <p:cNvPr id="19" name="Picture 18">
+            <a:extLst>
+              <a:ext uri="{FF2B5EF4-FFF2-40B4-BE49-F238E27FC236}">
+                <a16:creationId xmlns:a16="http://schemas.microsoft.com/office/drawing/2014/main" id="{44523689-D9D0-174A-BC4C-7A5471254379}"/>
+              </a:ext>
+            </a:extLst>
+          </p:cNvPr>
+          <p:cNvPicPr>
+            <a:picLocks noChangeAspect="1"/>
+          </p:cNvPicPr>
+          <p:nvPr/>
+        </p:nvPicPr>
+        <p:blipFill>
+          <a:blip r:embed="rId3"/>
+          <a:stretch>
+            <a:fillRect/>
+          </a:stretch>
+        </p:blipFill>
+        <p:spPr>
+          <a:xfrm>
+            <a:off x="8365839" y="1748712"/>
+            <a:ext cx="2606961" cy="1687231"/>
+          </a:xfrm>
+          <a:prstGeom prst="rect">
+            <a:avLst/>
+          </a:prstGeom>
+        </p:spPr>
+      </p:pic>
+      <p:pic>
+        <p:nvPicPr>
+          <p:cNvPr id="21" name="Picture 20">
+            <a:extLst>
+              <a:ext uri="{FF2B5EF4-FFF2-40B4-BE49-F238E27FC236}">
+                <a16:creationId xmlns:a16="http://schemas.microsoft.com/office/drawing/2014/main" id="{89966C9A-1DAD-2847-B0B1-B35A8A5AF5C0}"/>
+              </a:ext>
+            </a:extLst>
+          </p:cNvPr>
+          <p:cNvPicPr>
+            <a:picLocks noChangeAspect="1"/>
+          </p:cNvPicPr>
+          <p:nvPr/>
+        </p:nvPicPr>
+        <p:blipFill>
+          <a:blip r:embed="rId4"/>
+          <a:stretch>
+            <a:fillRect/>
+          </a:stretch>
+        </p:blipFill>
+        <p:spPr>
+          <a:xfrm>
+            <a:off x="3165761" y="4406900"/>
+            <a:ext cx="2562082" cy="1682750"/>
+          </a:xfrm>
+          <a:prstGeom prst="rect">
+            <a:avLst/>
+          </a:prstGeom>
+        </p:spPr>
+      </p:pic>
+      <p:pic>
+        <p:nvPicPr>
+          <p:cNvPr id="23" name="Picture 22">
+            <a:extLst>
+              <a:ext uri="{FF2B5EF4-FFF2-40B4-BE49-F238E27FC236}">
+                <a16:creationId xmlns:a16="http://schemas.microsoft.com/office/drawing/2014/main" id="{EF0D3663-D130-B246-912C-EF03C6BB93D2}"/>
+              </a:ext>
+            </a:extLst>
+          </p:cNvPr>
+          <p:cNvPicPr>
+            <a:picLocks noChangeAspect="1"/>
+          </p:cNvPicPr>
+          <p:nvPr/>
+        </p:nvPicPr>
+        <p:blipFill>
+          <a:blip r:embed="rId5"/>
+          <a:stretch>
+            <a:fillRect/>
+          </a:stretch>
+        </p:blipFill>
+        <p:spPr>
+          <a:xfrm>
+            <a:off x="5765800" y="4400550"/>
+            <a:ext cx="2569004" cy="1662664"/>
+          </a:xfrm>
+          <a:prstGeom prst="rect">
+            <a:avLst/>
+          </a:prstGeom>
+        </p:spPr>
+      </p:pic>
+      <p:pic>
+        <p:nvPicPr>
+          <p:cNvPr id="25" name="Picture 24">
+            <a:extLst>
+              <a:ext uri="{FF2B5EF4-FFF2-40B4-BE49-F238E27FC236}">
+                <a16:creationId xmlns:a16="http://schemas.microsoft.com/office/drawing/2014/main" id="{62487477-185B-E44D-97C2-FC535931A237}"/>
+              </a:ext>
+            </a:extLst>
+          </p:cNvPr>
+          <p:cNvPicPr>
+            <a:picLocks noChangeAspect="1"/>
+          </p:cNvPicPr>
+          <p:nvPr/>
+        </p:nvPicPr>
+        <p:blipFill>
+          <a:blip r:embed="rId6"/>
+          <a:stretch>
+            <a:fillRect/>
+          </a:stretch>
+        </p:blipFill>
+        <p:spPr>
+          <a:xfrm>
+            <a:off x="8372761" y="4391441"/>
+            <a:ext cx="2597150" cy="1680881"/>
+          </a:xfrm>
+          <a:prstGeom prst="rect">
+            <a:avLst/>
+          </a:prstGeom>
+        </p:spPr>
+      </p:pic>
+      <p:sp>
+        <p:nvSpPr>
+          <p:cNvPr id="26" name="TextBox 25">
+            <a:extLst>
+              <a:ext uri="{FF2B5EF4-FFF2-40B4-BE49-F238E27FC236}">
+                <a16:creationId xmlns:a16="http://schemas.microsoft.com/office/drawing/2014/main" id="{0DE03F73-B875-7E4E-BBBE-323A7F060C05}"/>
+              </a:ext>
+            </a:extLst>
+          </p:cNvPr>
+          <p:cNvSpPr txBox="1"/>
+          <p:nvPr/>
+        </p:nvSpPr>
+        <p:spPr>
+          <a:xfrm>
+            <a:off x="6508750" y="1361362"/>
+            <a:ext cx="1524000" cy="369332"/>
+          </a:xfrm>
+          <a:prstGeom prst="rect">
+            <a:avLst/>
+          </a:prstGeom>
+          <a:noFill/>
+        </p:spPr>
+        <p:txBody>
+          <a:bodyPr wrap="square" rtlCol="0">
+            <a:spAutoFit/>
+          </a:bodyPr>
+          <a:lstStyle/>
+          <a:p>
+            <a:r>
+              <a:rPr lang="en-US" dirty="0"/>
+              <a:t>1 Review Only</a:t>
+            </a:r>
+          </a:p>
+        </p:txBody>
+      </p:sp>
+      <p:sp>
+        <p:nvSpPr>
+          <p:cNvPr id="27" name="TextBox 26">
+            <a:extLst>
+              <a:ext uri="{FF2B5EF4-FFF2-40B4-BE49-F238E27FC236}">
+                <a16:creationId xmlns:a16="http://schemas.microsoft.com/office/drawing/2014/main" id="{C41C876A-FEDE-3C4F-8C20-4A388F6F11CE}"/>
+              </a:ext>
+            </a:extLst>
+          </p:cNvPr>
+          <p:cNvSpPr txBox="1"/>
+          <p:nvPr/>
+        </p:nvSpPr>
+        <p:spPr>
+          <a:xfrm>
+            <a:off x="9080501" y="1361362"/>
+            <a:ext cx="1574800" cy="369332"/>
+          </a:xfrm>
+          <a:prstGeom prst="rect">
+            <a:avLst/>
+          </a:prstGeom>
+          <a:noFill/>
+        </p:spPr>
+        <p:txBody>
+          <a:bodyPr wrap="square" rtlCol="0">
+            <a:spAutoFit/>
+          </a:bodyPr>
+          <a:lstStyle/>
+          <a:p>
+            <a:r>
+              <a:rPr lang="en-US" dirty="0"/>
+              <a:t>1-30 Reviews</a:t>
+            </a:r>
+          </a:p>
+        </p:txBody>
+      </p:sp>
+      <p:sp>
+        <p:nvSpPr>
+          <p:cNvPr id="28" name="TextBox 27">
+            <a:extLst>
+              <a:ext uri="{FF2B5EF4-FFF2-40B4-BE49-F238E27FC236}">
+                <a16:creationId xmlns:a16="http://schemas.microsoft.com/office/drawing/2014/main" id="{DFD2BE57-8255-3B48-8171-70A1D8E33593}"/>
+              </a:ext>
+            </a:extLst>
+          </p:cNvPr>
+          <p:cNvSpPr txBox="1"/>
+          <p:nvPr/>
+        </p:nvSpPr>
+        <p:spPr>
+          <a:xfrm>
+            <a:off x="3762804" y="4037568"/>
+            <a:ext cx="1739900" cy="369332"/>
+          </a:xfrm>
+          <a:prstGeom prst="rect">
+            <a:avLst/>
+          </a:prstGeom>
+          <a:noFill/>
+        </p:spPr>
+        <p:txBody>
+          <a:bodyPr wrap="square" rtlCol="0">
+            <a:spAutoFit/>
+          </a:bodyPr>
+          <a:lstStyle/>
+          <a:p>
+            <a:r>
+              <a:rPr lang="en-US" dirty="0"/>
+              <a:t>30-50 Reviews</a:t>
+            </a:r>
+          </a:p>
+        </p:txBody>
+      </p:sp>
+      <p:sp>
+        <p:nvSpPr>
+          <p:cNvPr id="29" name="TextBox 28">
+            <a:extLst>
+              <a:ext uri="{FF2B5EF4-FFF2-40B4-BE49-F238E27FC236}">
+                <a16:creationId xmlns:a16="http://schemas.microsoft.com/office/drawing/2014/main" id="{D4BE6943-7B51-A54C-B6C7-AD0ED375DFB2}"/>
+              </a:ext>
+            </a:extLst>
+          </p:cNvPr>
+          <p:cNvSpPr txBox="1"/>
+          <p:nvPr/>
+        </p:nvSpPr>
+        <p:spPr>
+          <a:xfrm>
+            <a:off x="6359955" y="4022109"/>
+            <a:ext cx="1739900" cy="369332"/>
+          </a:xfrm>
+          <a:prstGeom prst="rect">
+            <a:avLst/>
+          </a:prstGeom>
+          <a:noFill/>
+        </p:spPr>
+        <p:txBody>
+          <a:bodyPr wrap="square" rtlCol="0">
+            <a:spAutoFit/>
+          </a:bodyPr>
+          <a:lstStyle/>
+          <a:p>
+            <a:r>
+              <a:rPr lang="en-US" dirty="0"/>
+              <a:t>50-100 Reviews</a:t>
+            </a:r>
+          </a:p>
+        </p:txBody>
+      </p:sp>
+      <p:sp>
+        <p:nvSpPr>
+          <p:cNvPr id="30" name="TextBox 29">
+            <a:extLst>
+              <a:ext uri="{FF2B5EF4-FFF2-40B4-BE49-F238E27FC236}">
+                <a16:creationId xmlns:a16="http://schemas.microsoft.com/office/drawing/2014/main" id="{A59C3801-33A4-BB4E-B8A4-4333ACA0D33E}"/>
+              </a:ext>
+            </a:extLst>
+          </p:cNvPr>
+          <p:cNvSpPr txBox="1"/>
+          <p:nvPr/>
+        </p:nvSpPr>
+        <p:spPr>
+          <a:xfrm>
+            <a:off x="8820293" y="4021077"/>
+            <a:ext cx="2048018" cy="369332"/>
+          </a:xfrm>
+          <a:prstGeom prst="rect">
+            <a:avLst/>
+          </a:prstGeom>
+          <a:noFill/>
+        </p:spPr>
+        <p:txBody>
+          <a:bodyPr wrap="square" rtlCol="0">
+            <a:spAutoFit/>
+          </a:bodyPr>
+          <a:lstStyle/>
+          <a:p>
+            <a:r>
+              <a:rPr lang="en-US" dirty="0"/>
+              <a:t>100-1000 Reviews</a:t>
+            </a:r>
+          </a:p>
+        </p:txBody>
+      </p:sp>
+      <p:sp>
+        <p:nvSpPr>
+          <p:cNvPr id="31" name="TextBox 30">
+            <a:extLst>
+              <a:ext uri="{FF2B5EF4-FFF2-40B4-BE49-F238E27FC236}">
+                <a16:creationId xmlns:a16="http://schemas.microsoft.com/office/drawing/2014/main" id="{8E7725E7-6A75-C244-9532-9103BAFDFFE4}"/>
+              </a:ext>
+            </a:extLst>
+          </p:cNvPr>
+          <p:cNvSpPr txBox="1"/>
+          <p:nvPr/>
+        </p:nvSpPr>
+        <p:spPr>
+          <a:xfrm>
+            <a:off x="1282700" y="1612900"/>
+            <a:ext cx="4483100" cy="1938992"/>
+          </a:xfrm>
+          <a:prstGeom prst="rect">
+            <a:avLst/>
+          </a:prstGeom>
+          <a:noFill/>
+        </p:spPr>
+        <p:txBody>
+          <a:bodyPr wrap="square" rtlCol="0">
+            <a:spAutoFit/>
+          </a:bodyPr>
+          <a:lstStyle/>
+          <a:p>
+            <a:r>
+              <a:rPr lang="en-US" sz="2400" dirty="0"/>
+              <a:t>As Users write more reviews, the distribution of star ratings given become more and more normal. Otherwise, ratings are more commonly given on the extremes.</a:t>
+            </a:r>
+          </a:p>
+        </p:txBody>
+      </p:sp>
     </p:spTree>
     <p:extLst>
       <p:ext uri="{BB962C8B-B14F-4D97-AF65-F5344CB8AC3E}">
-        <p14:creationId xmlns:p14="http://schemas.microsoft.com/office/powerpoint/2010/main" val="1172023086"/>
+        <p14:creationId xmlns:p14="http://schemas.microsoft.com/office/powerpoint/2010/main" val="1947117358"/>
       </p:ext>
     </p:extLst>
   </p:cSld>
@@ -4283,7 +5690,7 @@
           <p:cNvPr id="2" name="Title 1">
             <a:extLst>
               <a:ext uri="{FF2B5EF4-FFF2-40B4-BE49-F238E27FC236}">
-                <a16:creationId xmlns:a16="http://schemas.microsoft.com/office/drawing/2014/main" id="{05BCE6F8-43EB-494D-A55E-067B045B5495}"/>
+                <a16:creationId xmlns:a16="http://schemas.microsoft.com/office/drawing/2014/main" id="{408E883B-88E0-4C45-A53E-3DF1B88F6FB5}"/>
               </a:ext>
             </a:extLst>
           </p:cNvPr>
@@ -4301,43 +5708,43 @@
           <a:p>
             <a:r>
               <a:rPr lang="en-US" dirty="0"/>
-              <a:t>Isolating Restaurants (continued)</a:t>
-            </a:r>
-          </a:p>
-        </p:txBody>
-      </p:sp>
-      <p:pic>
-        <p:nvPicPr>
-          <p:cNvPr id="5" name="Content Placeholder 4">
+              <a:t>Appendix</a:t>
+            </a:r>
+          </a:p>
+        </p:txBody>
+      </p:sp>
+      <p:sp>
+        <p:nvSpPr>
+          <p:cNvPr id="3" name="Text Placeholder 2">
             <a:extLst>
               <a:ext uri="{FF2B5EF4-FFF2-40B4-BE49-F238E27FC236}">
-                <a16:creationId xmlns:a16="http://schemas.microsoft.com/office/drawing/2014/main" id="{7FB581A9-3BBC-CB42-9B6B-DBC297F52908}"/>
+                <a16:creationId xmlns:a16="http://schemas.microsoft.com/office/drawing/2014/main" id="{8DCB8633-D41D-9746-B8CB-8D6C1E591EB0}"/>
               </a:ext>
             </a:extLst>
           </p:cNvPr>
-          <p:cNvPicPr>
-            <a:picLocks noGrp="1" noChangeAspect="1"/>
-          </p:cNvPicPr>
-          <p:nvPr>
-            <p:ph idx="1"/>
-          </p:nvPr>
-        </p:nvPicPr>
-        <p:blipFill rotWithShape="1">
-          <a:blip r:embed="rId2"/>
-          <a:srcRect t="69098"/>
-          <a:stretch/>
-        </p:blipFill>
-        <p:spPr>
-          <a:xfrm>
-            <a:off x="1371600" y="1428750"/>
-            <a:ext cx="9601200" cy="2180761"/>
-          </a:xfrm>
-        </p:spPr>
-      </p:pic>
+          <p:cNvSpPr>
+            <a:spLocks noGrp="1"/>
+          </p:cNvSpPr>
+          <p:nvPr>
+            <p:ph type="body" idx="1"/>
+          </p:nvPr>
+        </p:nvSpPr>
+        <p:spPr/>
+        <p:txBody>
+          <a:bodyPr/>
+          <a:lstStyle/>
+          <a:p>
+            <a:r>
+              <a:rPr lang="en-US" dirty="0"/>
+              <a:t>Code</a:t>
+            </a:r>
+          </a:p>
+        </p:txBody>
+      </p:sp>
     </p:spTree>
     <p:extLst>
       <p:ext uri="{BB962C8B-B14F-4D97-AF65-F5344CB8AC3E}">
-        <p14:creationId xmlns:p14="http://schemas.microsoft.com/office/powerpoint/2010/main" val="2420984817"/>
+        <p14:creationId xmlns:p14="http://schemas.microsoft.com/office/powerpoint/2010/main" val="1111073986"/>
       </p:ext>
     </p:extLst>
   </p:cSld>
@@ -4369,7 +5776,7 @@
           <p:cNvPr id="2" name="Title 1">
             <a:extLst>
               <a:ext uri="{FF2B5EF4-FFF2-40B4-BE49-F238E27FC236}">
-                <a16:creationId xmlns:a16="http://schemas.microsoft.com/office/drawing/2014/main" id="{514C8CD8-C383-B24F-8544-63A283BA4911}"/>
+                <a16:creationId xmlns:a16="http://schemas.microsoft.com/office/drawing/2014/main" id="{4E821EAE-1C76-9D4C-9662-203743DA3FEA}"/>
               </a:ext>
             </a:extLst>
           </p:cNvPr>
@@ -4387,17 +5794,17 @@
           <a:p>
             <a:r>
               <a:rPr lang="en-US" dirty="0"/>
-              <a:t>K-Means Clustering</a:t>
+              <a:t>Isolating Restaurants/Food Service</a:t>
             </a:r>
           </a:p>
         </p:txBody>
       </p:sp>
       <p:pic>
         <p:nvPicPr>
-          <p:cNvPr id="5" name="Content Placeholder 4">
+          <p:cNvPr id="9" name="Content Placeholder 8">
             <a:extLst>
               <a:ext uri="{FF2B5EF4-FFF2-40B4-BE49-F238E27FC236}">
-                <a16:creationId xmlns:a16="http://schemas.microsoft.com/office/drawing/2014/main" id="{42EB2A89-42FE-FE41-BAAF-ACF5152B4746}"/>
+                <a16:creationId xmlns:a16="http://schemas.microsoft.com/office/drawing/2014/main" id="{4C413E65-C89F-2548-BD10-CDCC75C2F324}"/>
               </a:ext>
             </a:extLst>
           </p:cNvPr>
@@ -4408,23 +5815,22 @@
             <p:ph idx="1"/>
           </p:nvPr>
         </p:nvPicPr>
-        <p:blipFill>
+        <p:blipFill rotWithShape="1">
           <a:blip r:embed="rId2"/>
-          <a:stretch>
-            <a:fillRect/>
-          </a:stretch>
+          <a:srcRect b="31275"/>
+          <a:stretch/>
         </p:blipFill>
         <p:spPr>
           <a:xfrm>
-            <a:off x="2414149" y="1428750"/>
-            <a:ext cx="7516102" cy="4956389"/>
+            <a:off x="1371600" y="1615864"/>
+            <a:ext cx="10024946" cy="5063905"/>
           </a:xfrm>
         </p:spPr>
       </p:pic>
     </p:spTree>
     <p:extLst>
       <p:ext uri="{BB962C8B-B14F-4D97-AF65-F5344CB8AC3E}">
-        <p14:creationId xmlns:p14="http://schemas.microsoft.com/office/powerpoint/2010/main" val="1937816005"/>
+        <p14:creationId xmlns:p14="http://schemas.microsoft.com/office/powerpoint/2010/main" val="1172023086"/>
       </p:ext>
     </p:extLst>
   </p:cSld>
@@ -4456,6 +5862,179 @@
           <p:cNvPr id="2" name="Title 1">
             <a:extLst>
               <a:ext uri="{FF2B5EF4-FFF2-40B4-BE49-F238E27FC236}">
+                <a16:creationId xmlns:a16="http://schemas.microsoft.com/office/drawing/2014/main" id="{05BCE6F8-43EB-494D-A55E-067B045B5495}"/>
+              </a:ext>
+            </a:extLst>
+          </p:cNvPr>
+          <p:cNvSpPr>
+            <a:spLocks noGrp="1"/>
+          </p:cNvSpPr>
+          <p:nvPr>
+            <p:ph type="title"/>
+          </p:nvPr>
+        </p:nvSpPr>
+        <p:spPr/>
+        <p:txBody>
+          <a:bodyPr/>
+          <a:lstStyle/>
+          <a:p>
+            <a:r>
+              <a:rPr lang="en-US" dirty="0"/>
+              <a:t>Isolating Restaurants (continued)</a:t>
+            </a:r>
+          </a:p>
+        </p:txBody>
+      </p:sp>
+      <p:pic>
+        <p:nvPicPr>
+          <p:cNvPr id="5" name="Content Placeholder 4">
+            <a:extLst>
+              <a:ext uri="{FF2B5EF4-FFF2-40B4-BE49-F238E27FC236}">
+                <a16:creationId xmlns:a16="http://schemas.microsoft.com/office/drawing/2014/main" id="{7FB581A9-3BBC-CB42-9B6B-DBC297F52908}"/>
+              </a:ext>
+            </a:extLst>
+          </p:cNvPr>
+          <p:cNvPicPr>
+            <a:picLocks noGrp="1" noChangeAspect="1"/>
+          </p:cNvPicPr>
+          <p:nvPr>
+            <p:ph idx="1"/>
+          </p:nvPr>
+        </p:nvPicPr>
+        <p:blipFill rotWithShape="1">
+          <a:blip r:embed="rId2"/>
+          <a:srcRect t="69098"/>
+          <a:stretch/>
+        </p:blipFill>
+        <p:spPr>
+          <a:xfrm>
+            <a:off x="1371600" y="1428750"/>
+            <a:ext cx="9601200" cy="2180761"/>
+          </a:xfrm>
+        </p:spPr>
+      </p:pic>
+    </p:spTree>
+    <p:extLst>
+      <p:ext uri="{BB962C8B-B14F-4D97-AF65-F5344CB8AC3E}">
+        <p14:creationId xmlns:p14="http://schemas.microsoft.com/office/powerpoint/2010/main" val="2420984817"/>
+      </p:ext>
+    </p:extLst>
+  </p:cSld>
+  <p:clrMapOvr>
+    <a:masterClrMapping/>
+  </p:clrMapOvr>
+</p:sld>
+</file>
+
+<file path=ppt/slides/slide17.xml><?xml version="1.0" encoding="utf-8"?>
+<p:sld xmlns:a="http://schemas.openxmlformats.org/drawingml/2006/main" xmlns:r="http://schemas.openxmlformats.org/officeDocument/2006/relationships" xmlns:p="http://schemas.openxmlformats.org/presentationml/2006/main">
+  <p:cSld>
+    <p:spTree>
+      <p:nvGrpSpPr>
+        <p:cNvPr id="1" name=""/>
+        <p:cNvGrpSpPr/>
+        <p:nvPr/>
+      </p:nvGrpSpPr>
+      <p:grpSpPr>
+        <a:xfrm>
+          <a:off x="0" y="0"/>
+          <a:ext cx="0" cy="0"/>
+          <a:chOff x="0" y="0"/>
+          <a:chExt cx="0" cy="0"/>
+        </a:xfrm>
+      </p:grpSpPr>
+      <p:sp>
+        <p:nvSpPr>
+          <p:cNvPr id="2" name="Title 1">
+            <a:extLst>
+              <a:ext uri="{FF2B5EF4-FFF2-40B4-BE49-F238E27FC236}">
+                <a16:creationId xmlns:a16="http://schemas.microsoft.com/office/drawing/2014/main" id="{514C8CD8-C383-B24F-8544-63A283BA4911}"/>
+              </a:ext>
+            </a:extLst>
+          </p:cNvPr>
+          <p:cNvSpPr>
+            <a:spLocks noGrp="1"/>
+          </p:cNvSpPr>
+          <p:nvPr>
+            <p:ph type="title"/>
+          </p:nvPr>
+        </p:nvSpPr>
+        <p:spPr/>
+        <p:txBody>
+          <a:bodyPr/>
+          <a:lstStyle/>
+          <a:p>
+            <a:r>
+              <a:rPr lang="en-US" dirty="0"/>
+              <a:t>K-Means Clustering</a:t>
+            </a:r>
+          </a:p>
+        </p:txBody>
+      </p:sp>
+      <p:pic>
+        <p:nvPicPr>
+          <p:cNvPr id="5" name="Content Placeholder 4">
+            <a:extLst>
+              <a:ext uri="{FF2B5EF4-FFF2-40B4-BE49-F238E27FC236}">
+                <a16:creationId xmlns:a16="http://schemas.microsoft.com/office/drawing/2014/main" id="{42EB2A89-42FE-FE41-BAAF-ACF5152B4746}"/>
+              </a:ext>
+            </a:extLst>
+          </p:cNvPr>
+          <p:cNvPicPr>
+            <a:picLocks noGrp="1" noChangeAspect="1"/>
+          </p:cNvPicPr>
+          <p:nvPr>
+            <p:ph idx="1"/>
+          </p:nvPr>
+        </p:nvPicPr>
+        <p:blipFill>
+          <a:blip r:embed="rId2"/>
+          <a:stretch>
+            <a:fillRect/>
+          </a:stretch>
+        </p:blipFill>
+        <p:spPr>
+          <a:xfrm>
+            <a:off x="2414149" y="1428750"/>
+            <a:ext cx="7516102" cy="4956389"/>
+          </a:xfrm>
+        </p:spPr>
+      </p:pic>
+    </p:spTree>
+    <p:extLst>
+      <p:ext uri="{BB962C8B-B14F-4D97-AF65-F5344CB8AC3E}">
+        <p14:creationId xmlns:p14="http://schemas.microsoft.com/office/powerpoint/2010/main" val="1937816005"/>
+      </p:ext>
+    </p:extLst>
+  </p:cSld>
+  <p:clrMapOvr>
+    <a:masterClrMapping/>
+  </p:clrMapOvr>
+</p:sld>
+</file>
+
+<file path=ppt/slides/slide18.xml><?xml version="1.0" encoding="utf-8"?>
+<p:sld xmlns:a="http://schemas.openxmlformats.org/drawingml/2006/main" xmlns:r="http://schemas.openxmlformats.org/officeDocument/2006/relationships" xmlns:p="http://schemas.openxmlformats.org/presentationml/2006/main">
+  <p:cSld>
+    <p:spTree>
+      <p:nvGrpSpPr>
+        <p:cNvPr id="1" name=""/>
+        <p:cNvGrpSpPr/>
+        <p:nvPr/>
+      </p:nvGrpSpPr>
+      <p:grpSpPr>
+        <a:xfrm>
+          <a:off x="0" y="0"/>
+          <a:ext cx="0" cy="0"/>
+          <a:chOff x="0" y="0"/>
+          <a:chExt cx="0" cy="0"/>
+        </a:xfrm>
+      </p:grpSpPr>
+      <p:sp>
+        <p:nvSpPr>
+          <p:cNvPr id="2" name="Title 1">
+            <a:extLst>
+              <a:ext uri="{FF2B5EF4-FFF2-40B4-BE49-F238E27FC236}">
                 <a16:creationId xmlns:a16="http://schemas.microsoft.com/office/drawing/2014/main" id="{E3AE87AD-AF5F-A641-B4FB-51CB4E03BABD}"/>
               </a:ext>
             </a:extLst>
@@ -4521,7 +6100,7 @@
 </p:sld>
 </file>
 
-<file path=ppt/slides/slide17.xml><?xml version="1.0" encoding="utf-8"?>
+<file path=ppt/slides/slide19.xml><?xml version="1.0" encoding="utf-8"?>
 <p:sld xmlns:a="http://schemas.openxmlformats.org/drawingml/2006/main" xmlns:r="http://schemas.openxmlformats.org/officeDocument/2006/relationships" xmlns:p="http://schemas.openxmlformats.org/presentationml/2006/main">
   <p:cSld>
     <p:spTree>

</xml_diff>

<commit_message>
add user reduction numbers to slide
</commit_message>
<xml_diff>
--- a/Lam_Contribution.pptx
+++ b/Lam_Contribution.pptx
@@ -3950,6 +3950,13 @@
             </a:r>
           </a:p>
           <a:p>
+            <a:pPr lvl="1"/>
+            <a:r>
+              <a:rPr lang="en-US" dirty="0"/>
+              <a:t>Reduced # Users: 960,561 → 64,986</a:t>
+            </a:r>
+          </a:p>
+          <a:p>
             <a:r>
               <a:rPr lang="en-US" dirty="0"/>
               <a:t>N Clusters selection: Select largest N that provides greater than 10% reduction in Sum of Squares Error</a:t>
@@ -3988,8 +3995,8 @@
         </p:blipFill>
         <p:spPr>
           <a:xfrm>
-            <a:off x="3547035" y="3836239"/>
-            <a:ext cx="1616635" cy="2786436"/>
+            <a:off x="3699575" y="4099157"/>
+            <a:ext cx="1464095" cy="2523518"/>
           </a:xfrm>
           <a:prstGeom prst="rect">
             <a:avLst/>
@@ -4018,7 +4025,7 @@
         </p:blipFill>
         <p:spPr>
           <a:xfrm>
-            <a:off x="7128435" y="4099157"/>
+            <a:off x="6875556" y="4230616"/>
             <a:ext cx="1879600" cy="2260600"/>
           </a:xfrm>
           <a:prstGeom prst="rect">
@@ -4040,7 +4047,7 @@
         </p:nvSpPr>
         <p:spPr>
           <a:xfrm>
-            <a:off x="5616388" y="4693795"/>
+            <a:off x="5425888" y="4927435"/>
             <a:ext cx="1111624" cy="866962"/>
           </a:xfrm>
           <a:prstGeom prst="rightArrow">

</xml_diff>